<commit_message>
Heat Map for PPT
</commit_message>
<xml_diff>
--- a/ML/PPT_ML_CA1_26 Nov 23.pptx
+++ b/ML/PPT_ML_CA1_26 Nov 23.pptx
@@ -5026,40 +5026,60 @@
             <p:ph type="title"/>
           </p:nvPr>
         </p:nvSpPr>
-        <p:spPr/>
-        <p:txBody>
-          <a:bodyPr/>
-          <a:lstStyle/>
-          <a:p>
-            <a:endParaRPr lang="en-IE"/>
-          </a:p>
-        </p:txBody>
-      </p:sp>
-      <p:sp>
-        <p:nvSpPr>
-          <p:cNvPr id="3" name="Content Placeholder 2">
+        <p:spPr>
+          <a:xfrm>
+            <a:off x="2020711" y="293511"/>
+            <a:ext cx="6655177" cy="677333"/>
+          </a:xfrm>
+        </p:spPr>
+        <p:txBody>
+          <a:bodyPr>
+            <a:normAutofit/>
+          </a:bodyPr>
+          <a:lstStyle/>
+          <a:p>
+            <a:r>
+              <a:rPr lang="en-IE" dirty="0"/>
+              <a:t>Heat Map </a:t>
+            </a:r>
+          </a:p>
+        </p:txBody>
+      </p:sp>
+      <p:pic>
+        <p:nvPicPr>
+          <p:cNvPr id="5" name="Content Placeholder 4">
             <a:extLst>
               <a:ext uri="{FF2B5EF4-FFF2-40B4-BE49-F238E27FC236}">
-                <a16:creationId xmlns:a16="http://schemas.microsoft.com/office/drawing/2014/main" id="{60E9B973-1F4D-8E44-51DF-FC9F31F7721F}"/>
+                <a16:creationId xmlns:a16="http://schemas.microsoft.com/office/drawing/2014/main" id="{681381C9-718A-2085-51A5-87EFC7CE3662}"/>
               </a:ext>
             </a:extLst>
           </p:cNvPr>
-          <p:cNvSpPr>
-            <a:spLocks noGrp="1"/>
-          </p:cNvSpPr>
+          <p:cNvPicPr>
+            <a:picLocks noGrp="1" noChangeAspect="1"/>
+          </p:cNvPicPr>
           <p:nvPr>
             <p:ph idx="1"/>
           </p:nvPr>
-        </p:nvSpPr>
-        <p:spPr/>
-        <p:txBody>
-          <a:bodyPr/>
-          <a:lstStyle/>
-          <a:p>
-            <a:endParaRPr lang="en-IE" dirty="0"/>
-          </a:p>
-        </p:txBody>
-      </p:sp>
+        </p:nvPicPr>
+        <p:blipFill>
+          <a:blip r:embed="rId2">
+            <a:extLst>
+              <a:ext uri="{28A0092B-C50C-407E-A947-70E740481C1C}">
+                <a14:useLocalDpi xmlns:a14="http://schemas.microsoft.com/office/drawing/2010/main" val="0"/>
+              </a:ext>
+            </a:extLst>
+          </a:blip>
+          <a:stretch>
+            <a:fillRect/>
+          </a:stretch>
+        </p:blipFill>
+        <p:spPr>
+          <a:xfrm>
+            <a:off x="2968978" y="970844"/>
+            <a:ext cx="5125155" cy="3973689"/>
+          </a:xfrm>
+        </p:spPr>
+      </p:pic>
     </p:spTree>
     <p:extLst>
       <p:ext uri="{BB962C8B-B14F-4D97-AF65-F5344CB8AC3E}">

</xml_diff>